<commit_message>
finished another round of edits. 4.5 pages. will give it a once over tomorrow
</commit_message>
<xml_diff>
--- a/Figure2and3combined.pptx
+++ b/Figure2and3combined.pptx
@@ -4340,6 +4340,66 @@
           </a:p>
         </p:txBody>
       </p:sp>
+      <p:pic>
+        <p:nvPicPr>
+          <p:cNvPr id="3" name="Picture 2"/>
+          <p:cNvPicPr>
+            <a:picLocks noChangeAspect="1"/>
+          </p:cNvPicPr>
+          <p:nvPr/>
+        </p:nvPicPr>
+        <p:blipFill>
+          <a:blip r:embed="rId6"/>
+          <a:stretch>
+            <a:fillRect/>
+          </a:stretch>
+        </p:blipFill>
+        <p:spPr>
+          <a:xfrm>
+            <a:off x="771129" y="4355917"/>
+            <a:ext cx="1486982" cy="1486982"/>
+          </a:xfrm>
+          <a:prstGeom prst="rect">
+            <a:avLst/>
+          </a:prstGeom>
+        </p:spPr>
+      </p:pic>
+      <p:cxnSp>
+        <p:nvCxnSpPr>
+          <p:cNvPr id="15" name="Straight Arrow Connector 14"/>
+          <p:cNvCxnSpPr/>
+          <p:nvPr/>
+        </p:nvCxnSpPr>
+        <p:spPr>
+          <a:xfrm flipH="1" flipV="1">
+            <a:off x="1831923" y="5186815"/>
+            <a:ext cx="600382" cy="220299"/>
+          </a:xfrm>
+          <a:prstGeom prst="straightConnector1">
+            <a:avLst/>
+          </a:prstGeom>
+          <a:ln w="25400">
+            <a:solidFill>
+              <a:schemeClr val="tx1"/>
+            </a:solidFill>
+            <a:tailEnd type="triangle"/>
+          </a:ln>
+        </p:spPr>
+        <p:style>
+          <a:lnRef idx="1">
+            <a:schemeClr val="accent1"/>
+          </a:lnRef>
+          <a:fillRef idx="0">
+            <a:schemeClr val="accent1"/>
+          </a:fillRef>
+          <a:effectRef idx="0">
+            <a:schemeClr val="accent1"/>
+          </a:effectRef>
+          <a:fontRef idx="minor">
+            <a:schemeClr val="tx1"/>
+          </a:fontRef>
+        </p:style>
+      </p:cxnSp>
     </p:spTree>
     <p:extLst>
       <p:ext uri="{BB962C8B-B14F-4D97-AF65-F5344CB8AC3E}">

</xml_diff>

<commit_message>
another round, another dollar
</commit_message>
<xml_diff>
--- a/Figure2and3combined.pptx
+++ b/Figure2and3combined.pptx
@@ -243,7 +243,7 @@
           <a:p>
             <a:fld id="{9A283E05-7B2C-074B-99DE-E9002AD7BB3A}" type="datetimeFigureOut">
               <a:rPr lang="en-US" smtClean="0"/>
-              <a:t>10/21/18</a:t>
+              <a:t>10/22/18</a:t>
             </a:fld>
             <a:endParaRPr lang="en-US"/>
           </a:p>
@@ -413,7 +413,7 @@
           <a:p>
             <a:fld id="{9A283E05-7B2C-074B-99DE-E9002AD7BB3A}" type="datetimeFigureOut">
               <a:rPr lang="en-US" smtClean="0"/>
-              <a:t>10/21/18</a:t>
+              <a:t>10/22/18</a:t>
             </a:fld>
             <a:endParaRPr lang="en-US"/>
           </a:p>
@@ -593,7 +593,7 @@
           <a:p>
             <a:fld id="{9A283E05-7B2C-074B-99DE-E9002AD7BB3A}" type="datetimeFigureOut">
               <a:rPr lang="en-US" smtClean="0"/>
-              <a:t>10/21/18</a:t>
+              <a:t>10/22/18</a:t>
             </a:fld>
             <a:endParaRPr lang="en-US"/>
           </a:p>
@@ -763,7 +763,7 @@
           <a:p>
             <a:fld id="{9A283E05-7B2C-074B-99DE-E9002AD7BB3A}" type="datetimeFigureOut">
               <a:rPr lang="en-US" smtClean="0"/>
-              <a:t>10/21/18</a:t>
+              <a:t>10/22/18</a:t>
             </a:fld>
             <a:endParaRPr lang="en-US"/>
           </a:p>
@@ -1009,7 +1009,7 @@
           <a:p>
             <a:fld id="{9A283E05-7B2C-074B-99DE-E9002AD7BB3A}" type="datetimeFigureOut">
               <a:rPr lang="en-US" smtClean="0"/>
-              <a:t>10/21/18</a:t>
+              <a:t>10/22/18</a:t>
             </a:fld>
             <a:endParaRPr lang="en-US"/>
           </a:p>
@@ -1241,7 +1241,7 @@
           <a:p>
             <a:fld id="{9A283E05-7B2C-074B-99DE-E9002AD7BB3A}" type="datetimeFigureOut">
               <a:rPr lang="en-US" smtClean="0"/>
-              <a:t>10/21/18</a:t>
+              <a:t>10/22/18</a:t>
             </a:fld>
             <a:endParaRPr lang="en-US"/>
           </a:p>
@@ -1608,7 +1608,7 @@
           <a:p>
             <a:fld id="{9A283E05-7B2C-074B-99DE-E9002AD7BB3A}" type="datetimeFigureOut">
               <a:rPr lang="en-US" smtClean="0"/>
-              <a:t>10/21/18</a:t>
+              <a:t>10/22/18</a:t>
             </a:fld>
             <a:endParaRPr lang="en-US"/>
           </a:p>
@@ -1726,7 +1726,7 @@
           <a:p>
             <a:fld id="{9A283E05-7B2C-074B-99DE-E9002AD7BB3A}" type="datetimeFigureOut">
               <a:rPr lang="en-US" smtClean="0"/>
-              <a:t>10/21/18</a:t>
+              <a:t>10/22/18</a:t>
             </a:fld>
             <a:endParaRPr lang="en-US"/>
           </a:p>
@@ -1821,7 +1821,7 @@
           <a:p>
             <a:fld id="{9A283E05-7B2C-074B-99DE-E9002AD7BB3A}" type="datetimeFigureOut">
               <a:rPr lang="en-US" smtClean="0"/>
-              <a:t>10/21/18</a:t>
+              <a:t>10/22/18</a:t>
             </a:fld>
             <a:endParaRPr lang="en-US"/>
           </a:p>
@@ -2098,7 +2098,7 @@
           <a:p>
             <a:fld id="{9A283E05-7B2C-074B-99DE-E9002AD7BB3A}" type="datetimeFigureOut">
               <a:rPr lang="en-US" smtClean="0"/>
-              <a:t>10/21/18</a:t>
+              <a:t>10/22/18</a:t>
             </a:fld>
             <a:endParaRPr lang="en-US"/>
           </a:p>
@@ -2351,7 +2351,7 @@
           <a:p>
             <a:fld id="{9A283E05-7B2C-074B-99DE-E9002AD7BB3A}" type="datetimeFigureOut">
               <a:rPr lang="en-US" smtClean="0"/>
-              <a:t>10/21/18</a:t>
+              <a:t>10/22/18</a:t>
             </a:fld>
             <a:endParaRPr lang="en-US"/>
           </a:p>
@@ -2564,7 +2564,7 @@
           <a:p>
             <a:fld id="{9A283E05-7B2C-074B-99DE-E9002AD7BB3A}" type="datetimeFigureOut">
               <a:rPr lang="en-US" smtClean="0"/>
-              <a:t>10/21/18</a:t>
+              <a:t>10/22/18</a:t>
             </a:fld>
             <a:endParaRPr lang="en-US"/>
           </a:p>
@@ -3534,7 +3534,7 @@
         <p:spPr>
           <a:xfrm>
             <a:off x="2615585" y="100275"/>
-            <a:ext cx="1552028" cy="307777"/>
+            <a:ext cx="1452642" cy="307777"/>
           </a:xfrm>
           <a:prstGeom prst="rect">
             <a:avLst/>
@@ -3569,15 +3569,7 @@
                 <a:ea typeface="Myriad Pro" charset="0"/>
                 <a:cs typeface="Myriad Pro" charset="0"/>
               </a:rPr>
-              <a:t> = 2, R</a:t>
-            </a:r>
-            <a:r>
-              <a:rPr lang="en-US" sz="1400" baseline="-25000" dirty="0" smtClean="0">
-                <a:latin typeface="Myriad Pro" charset="0"/>
-                <a:ea typeface="Myriad Pro" charset="0"/>
-                <a:cs typeface="Myriad Pro" charset="0"/>
-              </a:rPr>
-              <a:t>m</a:t>
+              <a:t> = 2, </a:t>
             </a:r>
             <a:r>
               <a:rPr lang="en-US" sz="1400" dirty="0" smtClean="0">
@@ -3585,7 +3577,15 @@
                 <a:ea typeface="Myriad Pro" charset="0"/>
                 <a:cs typeface="Myriad Pro" charset="0"/>
               </a:rPr>
-              <a:t> =2.76 </a:t>
+              <a:t>R </a:t>
+            </a:r>
+            <a:r>
+              <a:rPr lang="en-US" sz="1400" dirty="0" smtClean="0">
+                <a:latin typeface="Myriad Pro" charset="0"/>
+                <a:ea typeface="Myriad Pro" charset="0"/>
+                <a:cs typeface="Myriad Pro" charset="0"/>
+              </a:rPr>
+              <a:t>=2.76 </a:t>
             </a:r>
             <a:r>
               <a:rPr lang="en-US" sz="1400" dirty="0" err="1" smtClean="0">
@@ -3620,7 +3620,7 @@
         <p:spPr>
           <a:xfrm>
             <a:off x="2577113" y="2223327"/>
-            <a:ext cx="1590500" cy="307777"/>
+            <a:ext cx="1491114" cy="307777"/>
           </a:xfrm>
           <a:prstGeom prst="rect">
             <a:avLst/>
@@ -3658,28 +3658,12 @@
               <a:t> = 3, </a:t>
             </a:r>
             <a:r>
-              <a:rPr lang="en-US" sz="1400" dirty="0">
-                <a:latin typeface="Myriad Pro" charset="0"/>
-                <a:ea typeface="Myriad Pro" charset="0"/>
-                <a:cs typeface="Myriad Pro" charset="0"/>
-              </a:rPr>
-              <a:t>R</a:t>
-            </a:r>
-            <a:r>
-              <a:rPr lang="en-US" sz="1400" baseline="-25000" dirty="0">
-                <a:latin typeface="Myriad Pro" charset="0"/>
-                <a:ea typeface="Myriad Pro" charset="0"/>
-                <a:cs typeface="Myriad Pro" charset="0"/>
-              </a:rPr>
-              <a:t>m</a:t>
-            </a:r>
-            <a:r>
-              <a:rPr lang="en-US" sz="1400" dirty="0">
-                <a:latin typeface="Myriad Pro" charset="0"/>
-                <a:ea typeface="Myriad Pro" charset="0"/>
-                <a:cs typeface="Myriad Pro" charset="0"/>
-              </a:rPr>
-              <a:t> </a:t>
+              <a:rPr lang="en-US" sz="1400" dirty="0" smtClean="0">
+                <a:latin typeface="Myriad Pro" charset="0"/>
+                <a:ea typeface="Myriad Pro" charset="0"/>
+                <a:cs typeface="Myriad Pro" charset="0"/>
+              </a:rPr>
+              <a:t>R </a:t>
             </a:r>
             <a:r>
               <a:rPr lang="en-US" sz="1400" dirty="0" smtClean="0">
@@ -3733,7 +3717,7 @@
         <p:spPr>
           <a:xfrm>
             <a:off x="2591425" y="4415122"/>
-            <a:ext cx="1590500" cy="307777"/>
+            <a:ext cx="1491114" cy="307777"/>
           </a:xfrm>
           <a:prstGeom prst="rect">
             <a:avLst/>
@@ -3771,28 +3755,20 @@
               <a:t> = 4, </a:t>
             </a:r>
             <a:r>
+              <a:rPr lang="en-US" sz="1400" dirty="0" smtClean="0">
+                <a:latin typeface="Myriad Pro" charset="0"/>
+                <a:ea typeface="Myriad Pro" charset="0"/>
+                <a:cs typeface="Myriad Pro" charset="0"/>
+              </a:rPr>
+              <a:t>R </a:t>
+            </a:r>
+            <a:r>
               <a:rPr lang="en-US" sz="1400" dirty="0">
                 <a:latin typeface="Myriad Pro" charset="0"/>
                 <a:ea typeface="Myriad Pro" charset="0"/>
                 <a:cs typeface="Myriad Pro" charset="0"/>
               </a:rPr>
-              <a:t>R</a:t>
-            </a:r>
-            <a:r>
-              <a:rPr lang="en-US" sz="1400" baseline="-25000" dirty="0">
-                <a:latin typeface="Myriad Pro" charset="0"/>
-                <a:ea typeface="Myriad Pro" charset="0"/>
-                <a:cs typeface="Myriad Pro" charset="0"/>
-              </a:rPr>
-              <a:t>m</a:t>
-            </a:r>
-            <a:r>
-              <a:rPr lang="en-US" sz="1400" dirty="0">
-                <a:latin typeface="Myriad Pro" charset="0"/>
-                <a:ea typeface="Myriad Pro" charset="0"/>
-                <a:cs typeface="Myriad Pro" charset="0"/>
-              </a:rPr>
-              <a:t> = </a:t>
+              <a:t>= </a:t>
             </a:r>
             <a:r>
               <a:rPr lang="en-US" sz="1400" dirty="0" smtClean="0">
@@ -4340,30 +4316,6 @@
           </a:p>
         </p:txBody>
       </p:sp>
-      <p:pic>
-        <p:nvPicPr>
-          <p:cNvPr id="3" name="Picture 2"/>
-          <p:cNvPicPr>
-            <a:picLocks noChangeAspect="1"/>
-          </p:cNvPicPr>
-          <p:nvPr/>
-        </p:nvPicPr>
-        <p:blipFill>
-          <a:blip r:embed="rId6"/>
-          <a:stretch>
-            <a:fillRect/>
-          </a:stretch>
-        </p:blipFill>
-        <p:spPr>
-          <a:xfrm>
-            <a:off x="771129" y="4355917"/>
-            <a:ext cx="1486982" cy="1486982"/>
-          </a:xfrm>
-          <a:prstGeom prst="rect">
-            <a:avLst/>
-          </a:prstGeom>
-        </p:spPr>
-      </p:pic>
       <p:cxnSp>
         <p:nvCxnSpPr>
           <p:cNvPr id="15" name="Straight Arrow Connector 14"/>
@@ -4372,8 +4324,8 @@
         </p:nvCxnSpPr>
         <p:spPr>
           <a:xfrm flipH="1" flipV="1">
-            <a:off x="1831923" y="5186815"/>
-            <a:ext cx="600382" cy="220299"/>
+            <a:off x="1869277" y="5235120"/>
+            <a:ext cx="623273" cy="244055"/>
           </a:xfrm>
           <a:prstGeom prst="straightConnector1">
             <a:avLst/>
@@ -4400,6 +4352,182 @@
           </a:fontRef>
         </p:style>
       </p:cxnSp>
+      <p:pic>
+        <p:nvPicPr>
+          <p:cNvPr id="2" name="Picture 1"/>
+          <p:cNvPicPr>
+            <a:picLocks noChangeAspect="1"/>
+          </p:cNvPicPr>
+          <p:nvPr/>
+        </p:nvPicPr>
+        <p:blipFill>
+          <a:blip r:embed="rId6"/>
+          <a:stretch>
+            <a:fillRect/>
+          </a:stretch>
+        </p:blipFill>
+        <p:spPr>
+          <a:xfrm>
+            <a:off x="848122" y="4378005"/>
+            <a:ext cx="1356749" cy="1356749"/>
+          </a:xfrm>
+          <a:prstGeom prst="rect">
+            <a:avLst/>
+          </a:prstGeom>
+        </p:spPr>
+      </p:pic>
+      <p:sp>
+        <p:nvSpPr>
+          <p:cNvPr id="18" name="TextBox 17"/>
+          <p:cNvSpPr txBox="1"/>
+          <p:nvPr/>
+        </p:nvSpPr>
+        <p:spPr>
+          <a:xfrm>
+            <a:off x="736536" y="5321290"/>
+            <a:ext cx="474810" cy="292388"/>
+          </a:xfrm>
+          <a:prstGeom prst="rect">
+            <a:avLst/>
+          </a:prstGeom>
+          <a:noFill/>
+        </p:spPr>
+        <p:txBody>
+          <a:bodyPr wrap="none" rtlCol="0">
+            <a:spAutoFit/>
+          </a:bodyPr>
+          <a:lstStyle/>
+          <a:p>
+            <a:r>
+              <a:rPr lang="en-US" sz="1300" dirty="0" smtClean="0">
+                <a:latin typeface="Myriad Pro" charset="0"/>
+                <a:ea typeface="Myriad Pro" charset="0"/>
+                <a:cs typeface="Myriad Pro" charset="0"/>
+              </a:rPr>
+              <a:t>0.53</a:t>
+            </a:r>
+            <a:endParaRPr lang="en-US" sz="1300" dirty="0">
+              <a:latin typeface="Myriad Pro" charset="0"/>
+              <a:ea typeface="Myriad Pro" charset="0"/>
+              <a:cs typeface="Myriad Pro" charset="0"/>
+            </a:endParaRPr>
+          </a:p>
+        </p:txBody>
+      </p:sp>
+      <p:sp>
+        <p:nvSpPr>
+          <p:cNvPr id="43" name="TextBox 42"/>
+          <p:cNvSpPr txBox="1"/>
+          <p:nvPr/>
+        </p:nvSpPr>
+        <p:spPr>
+          <a:xfrm>
+            <a:off x="1802014" y="5314097"/>
+            <a:ext cx="474810" cy="292388"/>
+          </a:xfrm>
+          <a:prstGeom prst="rect">
+            <a:avLst/>
+          </a:prstGeom>
+          <a:noFill/>
+        </p:spPr>
+        <p:txBody>
+          <a:bodyPr wrap="none" rtlCol="0">
+            <a:spAutoFit/>
+          </a:bodyPr>
+          <a:lstStyle/>
+          <a:p>
+            <a:r>
+              <a:rPr lang="en-US" sz="1300" dirty="0" smtClean="0">
+                <a:latin typeface="Myriad Pro" charset="0"/>
+                <a:ea typeface="Myriad Pro" charset="0"/>
+                <a:cs typeface="Myriad Pro" charset="0"/>
+              </a:rPr>
+              <a:t>0.87</a:t>
+            </a:r>
+            <a:endParaRPr lang="en-US" sz="1300" dirty="0">
+              <a:latin typeface="Myriad Pro" charset="0"/>
+              <a:ea typeface="Myriad Pro" charset="0"/>
+              <a:cs typeface="Myriad Pro" charset="0"/>
+            </a:endParaRPr>
+          </a:p>
+        </p:txBody>
+      </p:sp>
+      <p:sp>
+        <p:nvSpPr>
+          <p:cNvPr id="47" name="TextBox 46"/>
+          <p:cNvSpPr txBox="1"/>
+          <p:nvPr/>
+        </p:nvSpPr>
+        <p:spPr>
+          <a:xfrm>
+            <a:off x="2160743" y="4621527"/>
+            <a:ext cx="474810" cy="292388"/>
+          </a:xfrm>
+          <a:prstGeom prst="rect">
+            <a:avLst/>
+          </a:prstGeom>
+          <a:noFill/>
+        </p:spPr>
+        <p:txBody>
+          <a:bodyPr wrap="none" rtlCol="0">
+            <a:spAutoFit/>
+          </a:bodyPr>
+          <a:lstStyle/>
+          <a:p>
+            <a:r>
+              <a:rPr lang="en-US" sz="1300" smtClean="0">
+                <a:latin typeface="Myriad Pro" charset="0"/>
+                <a:ea typeface="Myriad Pro" charset="0"/>
+                <a:cs typeface="Myriad Pro" charset="0"/>
+              </a:rPr>
+              <a:t>0.52</a:t>
+            </a:r>
+            <a:endParaRPr lang="en-US" sz="1300" dirty="0">
+              <a:latin typeface="Myriad Pro" charset="0"/>
+              <a:ea typeface="Myriad Pro" charset="0"/>
+              <a:cs typeface="Myriad Pro" charset="0"/>
+            </a:endParaRPr>
+          </a:p>
+        </p:txBody>
+      </p:sp>
+      <p:sp>
+        <p:nvSpPr>
+          <p:cNvPr id="48" name="TextBox 47"/>
+          <p:cNvSpPr txBox="1"/>
+          <p:nvPr/>
+        </p:nvSpPr>
+        <p:spPr>
+          <a:xfrm>
+            <a:off x="2160743" y="5155395"/>
+            <a:ext cx="474810" cy="292388"/>
+          </a:xfrm>
+          <a:prstGeom prst="rect">
+            <a:avLst/>
+          </a:prstGeom>
+          <a:noFill/>
+        </p:spPr>
+        <p:txBody>
+          <a:bodyPr wrap="none" rtlCol="0">
+            <a:spAutoFit/>
+          </a:bodyPr>
+          <a:lstStyle/>
+          <a:p>
+            <a:r>
+              <a:rPr lang="en-US" sz="1300" smtClean="0">
+                <a:latin typeface="Myriad Pro" charset="0"/>
+                <a:ea typeface="Myriad Pro" charset="0"/>
+                <a:cs typeface="Myriad Pro" charset="0"/>
+              </a:rPr>
+              <a:t>0.93</a:t>
+            </a:r>
+            <a:endParaRPr lang="en-US" sz="1300" dirty="0">
+              <a:latin typeface="Myriad Pro" charset="0"/>
+              <a:ea typeface="Myriad Pro" charset="0"/>
+              <a:cs typeface="Myriad Pro" charset="0"/>
+            </a:endParaRPr>
+          </a:p>
+        </p:txBody>
+      </p:sp>
     </p:spTree>
     <p:extLst>
       <p:ext uri="{BB962C8B-B14F-4D97-AF65-F5344CB8AC3E}">

</xml_diff>

<commit_message>
reply to refs done. manuscript edits done.
</commit_message>
<xml_diff>
--- a/Figure2and3combined.pptx
+++ b/Figure2and3combined.pptx
@@ -243,7 +243,7 @@
           <a:p>
             <a:fld id="{9A283E05-7B2C-074B-99DE-E9002AD7BB3A}" type="datetimeFigureOut">
               <a:rPr lang="en-US" smtClean="0"/>
-              <a:t>10/22/18</a:t>
+              <a:t>1/26/19</a:t>
             </a:fld>
             <a:endParaRPr lang="en-US"/>
           </a:p>
@@ -413,7 +413,7 @@
           <a:p>
             <a:fld id="{9A283E05-7B2C-074B-99DE-E9002AD7BB3A}" type="datetimeFigureOut">
               <a:rPr lang="en-US" smtClean="0"/>
-              <a:t>10/22/18</a:t>
+              <a:t>1/26/19</a:t>
             </a:fld>
             <a:endParaRPr lang="en-US"/>
           </a:p>
@@ -593,7 +593,7 @@
           <a:p>
             <a:fld id="{9A283E05-7B2C-074B-99DE-E9002AD7BB3A}" type="datetimeFigureOut">
               <a:rPr lang="en-US" smtClean="0"/>
-              <a:t>10/22/18</a:t>
+              <a:t>1/26/19</a:t>
             </a:fld>
             <a:endParaRPr lang="en-US"/>
           </a:p>
@@ -763,7 +763,7 @@
           <a:p>
             <a:fld id="{9A283E05-7B2C-074B-99DE-E9002AD7BB3A}" type="datetimeFigureOut">
               <a:rPr lang="en-US" smtClean="0"/>
-              <a:t>10/22/18</a:t>
+              <a:t>1/26/19</a:t>
             </a:fld>
             <a:endParaRPr lang="en-US"/>
           </a:p>
@@ -1009,7 +1009,7 @@
           <a:p>
             <a:fld id="{9A283E05-7B2C-074B-99DE-E9002AD7BB3A}" type="datetimeFigureOut">
               <a:rPr lang="en-US" smtClean="0"/>
-              <a:t>10/22/18</a:t>
+              <a:t>1/26/19</a:t>
             </a:fld>
             <a:endParaRPr lang="en-US"/>
           </a:p>
@@ -1241,7 +1241,7 @@
           <a:p>
             <a:fld id="{9A283E05-7B2C-074B-99DE-E9002AD7BB3A}" type="datetimeFigureOut">
               <a:rPr lang="en-US" smtClean="0"/>
-              <a:t>10/22/18</a:t>
+              <a:t>1/26/19</a:t>
             </a:fld>
             <a:endParaRPr lang="en-US"/>
           </a:p>
@@ -1608,7 +1608,7 @@
           <a:p>
             <a:fld id="{9A283E05-7B2C-074B-99DE-E9002AD7BB3A}" type="datetimeFigureOut">
               <a:rPr lang="en-US" smtClean="0"/>
-              <a:t>10/22/18</a:t>
+              <a:t>1/26/19</a:t>
             </a:fld>
             <a:endParaRPr lang="en-US"/>
           </a:p>
@@ -1726,7 +1726,7 @@
           <a:p>
             <a:fld id="{9A283E05-7B2C-074B-99DE-E9002AD7BB3A}" type="datetimeFigureOut">
               <a:rPr lang="en-US" smtClean="0"/>
-              <a:t>10/22/18</a:t>
+              <a:t>1/26/19</a:t>
             </a:fld>
             <a:endParaRPr lang="en-US"/>
           </a:p>
@@ -1821,7 +1821,7 @@
           <a:p>
             <a:fld id="{9A283E05-7B2C-074B-99DE-E9002AD7BB3A}" type="datetimeFigureOut">
               <a:rPr lang="en-US" smtClean="0"/>
-              <a:t>10/22/18</a:t>
+              <a:t>1/26/19</a:t>
             </a:fld>
             <a:endParaRPr lang="en-US"/>
           </a:p>
@@ -2098,7 +2098,7 @@
           <a:p>
             <a:fld id="{9A283E05-7B2C-074B-99DE-E9002AD7BB3A}" type="datetimeFigureOut">
               <a:rPr lang="en-US" smtClean="0"/>
-              <a:t>10/22/18</a:t>
+              <a:t>1/26/19</a:t>
             </a:fld>
             <a:endParaRPr lang="en-US"/>
           </a:p>
@@ -2351,7 +2351,7 @@
           <a:p>
             <a:fld id="{9A283E05-7B2C-074B-99DE-E9002AD7BB3A}" type="datetimeFigureOut">
               <a:rPr lang="en-US" smtClean="0"/>
-              <a:t>10/22/18</a:t>
+              <a:t>1/26/19</a:t>
             </a:fld>
             <a:endParaRPr lang="en-US"/>
           </a:p>
@@ -2564,7 +2564,7 @@
           <a:p>
             <a:fld id="{9A283E05-7B2C-074B-99DE-E9002AD7BB3A}" type="datetimeFigureOut">
               <a:rPr lang="en-US" smtClean="0"/>
-              <a:t>10/22/18</a:t>
+              <a:t>1/26/19</a:t>
             </a:fld>
             <a:endParaRPr lang="en-US"/>
           </a:p>
@@ -3569,23 +3569,7 @@
                 <a:ea typeface="Myriad Pro" charset="0"/>
                 <a:cs typeface="Myriad Pro" charset="0"/>
               </a:rPr>
-              <a:t> = 2, </a:t>
-            </a:r>
-            <a:r>
-              <a:rPr lang="en-US" sz="1400" dirty="0" smtClean="0">
-                <a:latin typeface="Myriad Pro" charset="0"/>
-                <a:ea typeface="Myriad Pro" charset="0"/>
-                <a:cs typeface="Myriad Pro" charset="0"/>
-              </a:rPr>
-              <a:t>R </a:t>
-            </a:r>
-            <a:r>
-              <a:rPr lang="en-US" sz="1400" dirty="0" smtClean="0">
-                <a:latin typeface="Myriad Pro" charset="0"/>
-                <a:ea typeface="Myriad Pro" charset="0"/>
-                <a:cs typeface="Myriad Pro" charset="0"/>
-              </a:rPr>
-              <a:t>=2.76 </a:t>
+              <a:t> = 2, R =2.76 </a:t>
             </a:r>
             <a:r>
               <a:rPr lang="en-US" sz="1400" dirty="0" err="1" smtClean="0">
@@ -3655,23 +3639,7 @@
                 <a:ea typeface="Myriad Pro" charset="0"/>
                 <a:cs typeface="Myriad Pro" charset="0"/>
               </a:rPr>
-              <a:t> = 3, </a:t>
-            </a:r>
-            <a:r>
-              <a:rPr lang="en-US" sz="1400" dirty="0" smtClean="0">
-                <a:latin typeface="Myriad Pro" charset="0"/>
-                <a:ea typeface="Myriad Pro" charset="0"/>
-                <a:cs typeface="Myriad Pro" charset="0"/>
-              </a:rPr>
-              <a:t>R </a:t>
-            </a:r>
-            <a:r>
-              <a:rPr lang="en-US" sz="1400" dirty="0" smtClean="0">
-                <a:latin typeface="Myriad Pro" charset="0"/>
-                <a:ea typeface="Myriad Pro" charset="0"/>
-                <a:cs typeface="Myriad Pro" charset="0"/>
-              </a:rPr>
-              <a:t>=</a:t>
+              <a:t> = 3, R =</a:t>
             </a:r>
             <a:r>
               <a:rPr lang="en-US" sz="1400" dirty="0">
@@ -3752,15 +3720,7 @@
                 <a:ea typeface="Myriad Pro" charset="0"/>
                 <a:cs typeface="Myriad Pro" charset="0"/>
               </a:rPr>
-              <a:t> = 4, </a:t>
-            </a:r>
-            <a:r>
-              <a:rPr lang="en-US" sz="1400" dirty="0" smtClean="0">
-                <a:latin typeface="Myriad Pro" charset="0"/>
-                <a:ea typeface="Myriad Pro" charset="0"/>
-                <a:cs typeface="Myriad Pro" charset="0"/>
-              </a:rPr>
-              <a:t>R </a:t>
+              <a:t> = 4, R </a:t>
             </a:r>
             <a:r>
               <a:rPr lang="en-US" sz="1400" dirty="0">
@@ -4521,6 +4481,800 @@
               <a:t>0.93</a:t>
             </a:r>
             <a:endParaRPr lang="en-US" sz="1300" dirty="0">
+              <a:latin typeface="Myriad Pro" charset="0"/>
+              <a:ea typeface="Myriad Pro" charset="0"/>
+              <a:cs typeface="Myriad Pro" charset="0"/>
+            </a:endParaRPr>
+          </a:p>
+        </p:txBody>
+      </p:sp>
+      <p:pic>
+        <p:nvPicPr>
+          <p:cNvPr id="3" name="Picture 2"/>
+          <p:cNvPicPr>
+            <a:picLocks noChangeAspect="1"/>
+          </p:cNvPicPr>
+          <p:nvPr/>
+        </p:nvPicPr>
+        <p:blipFill>
+          <a:blip r:embed="rId7">
+            <a:extLst>
+              <a:ext uri="{28A0092B-C50C-407E-A947-70E740481C1C}">
+                <a14:useLocalDpi xmlns:a14="http://schemas.microsoft.com/office/drawing/2010/main" val="0"/>
+              </a:ext>
+            </a:extLst>
+          </a:blip>
+          <a:stretch>
+            <a:fillRect/>
+          </a:stretch>
+        </p:blipFill>
+        <p:spPr>
+          <a:xfrm>
+            <a:off x="8608265" y="76111"/>
+            <a:ext cx="3175000" cy="3175000"/>
+          </a:xfrm>
+          <a:prstGeom prst="rect">
+            <a:avLst/>
+          </a:prstGeom>
+        </p:spPr>
+      </p:pic>
+      <p:sp>
+        <p:nvSpPr>
+          <p:cNvPr id="49" name="TextBox 48"/>
+          <p:cNvSpPr txBox="1"/>
+          <p:nvPr/>
+        </p:nvSpPr>
+        <p:spPr>
+          <a:xfrm>
+            <a:off x="11435376" y="2711317"/>
+            <a:ext cx="495649" cy="307777"/>
+          </a:xfrm>
+          <a:prstGeom prst="rect">
+            <a:avLst/>
+          </a:prstGeom>
+          <a:noFill/>
+        </p:spPr>
+        <p:txBody>
+          <a:bodyPr wrap="none" rtlCol="0">
+            <a:spAutoFit/>
+          </a:bodyPr>
+          <a:lstStyle/>
+          <a:p>
+            <a:r>
+              <a:rPr lang="en-US" sz="1400" dirty="0" smtClean="0">
+                <a:latin typeface="Myriad Pro" charset="0"/>
+                <a:ea typeface="Myriad Pro" charset="0"/>
+                <a:cs typeface="Myriad Pro" charset="0"/>
+              </a:rPr>
+              <a:t>0.94</a:t>
+            </a:r>
+            <a:endParaRPr lang="en-US" sz="1400" dirty="0">
+              <a:latin typeface="Myriad Pro" charset="0"/>
+              <a:ea typeface="Myriad Pro" charset="0"/>
+              <a:cs typeface="Myriad Pro" charset="0"/>
+            </a:endParaRPr>
+          </a:p>
+        </p:txBody>
+      </p:sp>
+      <p:sp>
+        <p:nvSpPr>
+          <p:cNvPr id="50" name="TextBox 49"/>
+          <p:cNvSpPr txBox="1"/>
+          <p:nvPr/>
+        </p:nvSpPr>
+        <p:spPr>
+          <a:xfrm>
+            <a:off x="9313125" y="2711317"/>
+            <a:ext cx="276038" cy="307777"/>
+          </a:xfrm>
+          <a:prstGeom prst="rect">
+            <a:avLst/>
+          </a:prstGeom>
+          <a:noFill/>
+        </p:spPr>
+        <p:txBody>
+          <a:bodyPr wrap="none" rtlCol="0">
+            <a:spAutoFit/>
+          </a:bodyPr>
+          <a:lstStyle/>
+          <a:p>
+            <a:r>
+              <a:rPr lang="en-US" sz="1400" dirty="0" smtClean="0">
+                <a:latin typeface="Myriad Pro" charset="0"/>
+                <a:ea typeface="Myriad Pro" charset="0"/>
+                <a:cs typeface="Myriad Pro" charset="0"/>
+              </a:rPr>
+              <a:t>0</a:t>
+            </a:r>
+            <a:endParaRPr lang="en-US" sz="1400" dirty="0">
+              <a:latin typeface="Myriad Pro" charset="0"/>
+              <a:ea typeface="Myriad Pro" charset="0"/>
+              <a:cs typeface="Myriad Pro" charset="0"/>
+            </a:endParaRPr>
+          </a:p>
+        </p:txBody>
+      </p:sp>
+      <p:cxnSp>
+        <p:nvCxnSpPr>
+          <p:cNvPr id="51" name="Straight Connector 50"/>
+          <p:cNvCxnSpPr/>
+          <p:nvPr/>
+        </p:nvCxnSpPr>
+        <p:spPr>
+          <a:xfrm>
+            <a:off x="10456385" y="2087712"/>
+            <a:ext cx="640080" cy="0"/>
+          </a:xfrm>
+          <a:prstGeom prst="line">
+            <a:avLst/>
+          </a:prstGeom>
+          <a:ln w="31750">
+            <a:solidFill>
+              <a:schemeClr val="accent5"/>
+            </a:solidFill>
+          </a:ln>
+        </p:spPr>
+        <p:style>
+          <a:lnRef idx="1">
+            <a:schemeClr val="accent1"/>
+          </a:lnRef>
+          <a:fillRef idx="0">
+            <a:schemeClr val="accent1"/>
+          </a:fillRef>
+          <a:effectRef idx="0">
+            <a:schemeClr val="accent1"/>
+          </a:effectRef>
+          <a:fontRef idx="minor">
+            <a:schemeClr val="tx1"/>
+          </a:fontRef>
+        </p:style>
+      </p:cxnSp>
+      <p:cxnSp>
+        <p:nvCxnSpPr>
+          <p:cNvPr id="52" name="Straight Connector 51"/>
+          <p:cNvCxnSpPr/>
+          <p:nvPr/>
+        </p:nvCxnSpPr>
+        <p:spPr>
+          <a:xfrm>
+            <a:off x="10456385" y="2328458"/>
+            <a:ext cx="640080" cy="0"/>
+          </a:xfrm>
+          <a:prstGeom prst="line">
+            <a:avLst/>
+          </a:prstGeom>
+          <a:ln w="31750">
+            <a:solidFill>
+              <a:srgbClr val="FF0000"/>
+            </a:solidFill>
+            <a:prstDash val="sysDot"/>
+          </a:ln>
+        </p:spPr>
+        <p:style>
+          <a:lnRef idx="1">
+            <a:schemeClr val="accent1"/>
+          </a:lnRef>
+          <a:fillRef idx="0">
+            <a:schemeClr val="accent1"/>
+          </a:fillRef>
+          <a:effectRef idx="0">
+            <a:schemeClr val="accent1"/>
+          </a:effectRef>
+          <a:fontRef idx="minor">
+            <a:schemeClr val="tx1"/>
+          </a:fontRef>
+        </p:style>
+      </p:cxnSp>
+      <p:cxnSp>
+        <p:nvCxnSpPr>
+          <p:cNvPr id="53" name="Straight Connector 52"/>
+          <p:cNvCxnSpPr/>
+          <p:nvPr/>
+        </p:nvCxnSpPr>
+        <p:spPr>
+          <a:xfrm flipV="1">
+            <a:off x="10456385" y="2588252"/>
+            <a:ext cx="640080" cy="4762"/>
+          </a:xfrm>
+          <a:prstGeom prst="line">
+            <a:avLst/>
+          </a:prstGeom>
+          <a:ln w="31750">
+            <a:solidFill>
+              <a:schemeClr val="accent2"/>
+            </a:solidFill>
+            <a:prstDash val="dash"/>
+          </a:ln>
+        </p:spPr>
+        <p:style>
+          <a:lnRef idx="1">
+            <a:schemeClr val="accent1"/>
+          </a:lnRef>
+          <a:fillRef idx="0">
+            <a:schemeClr val="accent1"/>
+          </a:fillRef>
+          <a:effectRef idx="0">
+            <a:schemeClr val="accent1"/>
+          </a:effectRef>
+          <a:fontRef idx="minor">
+            <a:schemeClr val="tx1"/>
+          </a:fontRef>
+        </p:style>
+      </p:cxnSp>
+      <p:sp>
+        <p:nvSpPr>
+          <p:cNvPr id="54" name="TextBox 53"/>
+          <p:cNvSpPr txBox="1"/>
+          <p:nvPr/>
+        </p:nvSpPr>
+        <p:spPr>
+          <a:xfrm>
+            <a:off x="9389925" y="1933824"/>
+            <a:ext cx="984565" cy="307777"/>
+          </a:xfrm>
+          <a:prstGeom prst="rect">
+            <a:avLst/>
+          </a:prstGeom>
+          <a:noFill/>
+        </p:spPr>
+        <p:txBody>
+          <a:bodyPr wrap="none" rtlCol="0">
+            <a:spAutoFit/>
+          </a:bodyPr>
+          <a:lstStyle/>
+          <a:p>
+            <a:r>
+              <a:rPr lang="en-US" sz="1400" dirty="0" err="1" smtClean="0">
+                <a:latin typeface="Myriad Pro" charset="0"/>
+                <a:ea typeface="Myriad Pro" charset="0"/>
+                <a:cs typeface="Myriad Pro" charset="0"/>
+              </a:rPr>
+              <a:t>Variational</a:t>
+            </a:r>
+            <a:endParaRPr lang="en-US" sz="1400" dirty="0">
+              <a:latin typeface="Myriad Pro" charset="0"/>
+              <a:ea typeface="Myriad Pro" charset="0"/>
+              <a:cs typeface="Myriad Pro" charset="0"/>
+            </a:endParaRPr>
+          </a:p>
+        </p:txBody>
+      </p:sp>
+      <p:sp>
+        <p:nvSpPr>
+          <p:cNvPr id="55" name="TextBox 54"/>
+          <p:cNvSpPr txBox="1"/>
+          <p:nvPr/>
+        </p:nvSpPr>
+        <p:spPr>
+          <a:xfrm>
+            <a:off x="9389923" y="2174570"/>
+            <a:ext cx="950901" cy="307777"/>
+          </a:xfrm>
+          <a:prstGeom prst="rect">
+            <a:avLst/>
+          </a:prstGeom>
+          <a:noFill/>
+        </p:spPr>
+        <p:txBody>
+          <a:bodyPr wrap="none" rtlCol="0">
+            <a:spAutoFit/>
+          </a:bodyPr>
+          <a:lstStyle/>
+          <a:p>
+            <a:r>
+              <a:rPr lang="en-US" sz="1400" dirty="0" smtClean="0">
+                <a:latin typeface="Myriad Pro" charset="0"/>
+                <a:ea typeface="Myriad Pro" charset="0"/>
+                <a:cs typeface="Myriad Pro" charset="0"/>
+              </a:rPr>
+              <a:t>Numerical</a:t>
+            </a:r>
+            <a:endParaRPr lang="en-US" sz="1400" dirty="0">
+              <a:latin typeface="Myriad Pro" charset="0"/>
+              <a:ea typeface="Myriad Pro" charset="0"/>
+              <a:cs typeface="Myriad Pro" charset="0"/>
+            </a:endParaRPr>
+          </a:p>
+        </p:txBody>
+      </p:sp>
+      <p:sp>
+        <p:nvSpPr>
+          <p:cNvPr id="56" name="TextBox 55"/>
+          <p:cNvSpPr txBox="1"/>
+          <p:nvPr/>
+        </p:nvSpPr>
+        <p:spPr>
+          <a:xfrm>
+            <a:off x="9389924" y="2434364"/>
+            <a:ext cx="1114408" cy="307777"/>
+          </a:xfrm>
+          <a:prstGeom prst="rect">
+            <a:avLst/>
+          </a:prstGeom>
+          <a:noFill/>
+        </p:spPr>
+        <p:txBody>
+          <a:bodyPr wrap="none" rtlCol="0">
+            <a:spAutoFit/>
+          </a:bodyPr>
+          <a:lstStyle/>
+          <a:p>
+            <a:r>
+              <a:rPr lang="en-US" sz="1400" dirty="0" err="1" smtClean="0">
+                <a:latin typeface="Myriad Pro" charset="0"/>
+                <a:ea typeface="Myriad Pro" charset="0"/>
+                <a:cs typeface="Myriad Pro" charset="0"/>
+              </a:rPr>
+              <a:t>Perturbative</a:t>
+            </a:r>
+            <a:endParaRPr lang="en-US" sz="1400" dirty="0">
+              <a:latin typeface="Myriad Pro" charset="0"/>
+              <a:ea typeface="Myriad Pro" charset="0"/>
+              <a:cs typeface="Myriad Pro" charset="0"/>
+            </a:endParaRPr>
+          </a:p>
+        </p:txBody>
+      </p:sp>
+      <p:sp>
+        <p:nvSpPr>
+          <p:cNvPr id="57" name="TextBox 56"/>
+          <p:cNvSpPr txBox="1"/>
+          <p:nvPr/>
+        </p:nvSpPr>
+        <p:spPr>
+          <a:xfrm>
+            <a:off x="10459394" y="106350"/>
+            <a:ext cx="1452642" cy="307777"/>
+          </a:xfrm>
+          <a:prstGeom prst="rect">
+            <a:avLst/>
+          </a:prstGeom>
+          <a:noFill/>
+        </p:spPr>
+        <p:txBody>
+          <a:bodyPr wrap="none" rtlCol="0">
+            <a:spAutoFit/>
+          </a:bodyPr>
+          <a:lstStyle/>
+          <a:p>
+            <a:r>
+              <a:rPr lang="en-US" sz="1400" dirty="0" smtClean="0">
+                <a:latin typeface="Myriad Pro" charset="0"/>
+                <a:ea typeface="Myriad Pro" charset="0"/>
+                <a:cs typeface="Myriad Pro" charset="0"/>
+              </a:rPr>
+              <a:t>N</a:t>
+            </a:r>
+            <a:r>
+              <a:rPr lang="en-US" sz="1400" baseline="-25000" dirty="0" smtClean="0">
+                <a:latin typeface="Myriad Pro" charset="0"/>
+                <a:ea typeface="Myriad Pro" charset="0"/>
+                <a:cs typeface="Myriad Pro" charset="0"/>
+              </a:rPr>
+              <a:t>a</a:t>
+            </a:r>
+            <a:r>
+              <a:rPr lang="en-US" sz="1400" dirty="0" smtClean="0">
+                <a:latin typeface="Myriad Pro" charset="0"/>
+                <a:ea typeface="Myriad Pro" charset="0"/>
+                <a:cs typeface="Myriad Pro" charset="0"/>
+              </a:rPr>
+              <a:t> = 2, R =2.76 </a:t>
+            </a:r>
+            <a:r>
+              <a:rPr lang="en-US" sz="1400" dirty="0" err="1" smtClean="0">
+                <a:latin typeface="Myriad Pro" charset="0"/>
+                <a:ea typeface="Myriad Pro" charset="0"/>
+                <a:cs typeface="Myriad Pro" charset="0"/>
+              </a:rPr>
+              <a:t>Å</a:t>
+            </a:r>
+            <a:r>
+              <a:rPr lang="en-US" sz="1400" dirty="0" smtClean="0">
+                <a:latin typeface="Myriad Pro" charset="0"/>
+                <a:ea typeface="Myriad Pro" charset="0"/>
+                <a:cs typeface="Myriad Pro" charset="0"/>
+              </a:rPr>
+              <a:t> </a:t>
+            </a:r>
+            <a:endParaRPr lang="en-US" sz="1400" dirty="0">
+              <a:latin typeface="Myriad Pro" charset="0"/>
+              <a:ea typeface="Myriad Pro" charset="0"/>
+              <a:cs typeface="Myriad Pro" charset="0"/>
+            </a:endParaRPr>
+          </a:p>
+        </p:txBody>
+      </p:sp>
+      <p:pic>
+        <p:nvPicPr>
+          <p:cNvPr id="6" name="Picture 5"/>
+          <p:cNvPicPr>
+            <a:picLocks noChangeAspect="1"/>
+          </p:cNvPicPr>
+          <p:nvPr/>
+        </p:nvPicPr>
+        <p:blipFill>
+          <a:blip r:embed="rId8">
+            <a:extLst>
+              <a:ext uri="{28A0092B-C50C-407E-A947-70E740481C1C}">
+                <a14:useLocalDpi xmlns:a14="http://schemas.microsoft.com/office/drawing/2010/main" val="0"/>
+              </a:ext>
+            </a:extLst>
+          </a:blip>
+          <a:stretch>
+            <a:fillRect/>
+          </a:stretch>
+        </p:blipFill>
+        <p:spPr>
+          <a:xfrm>
+            <a:off x="8608265" y="3211857"/>
+            <a:ext cx="3175000" cy="3175000"/>
+          </a:xfrm>
+          <a:prstGeom prst="rect">
+            <a:avLst/>
+          </a:prstGeom>
+        </p:spPr>
+      </p:pic>
+      <p:cxnSp>
+        <p:nvCxnSpPr>
+          <p:cNvPr id="58" name="Straight Connector 57"/>
+          <p:cNvCxnSpPr/>
+          <p:nvPr/>
+        </p:nvCxnSpPr>
+        <p:spPr>
+          <a:xfrm>
+            <a:off x="10279430" y="3531297"/>
+            <a:ext cx="640080" cy="0"/>
+          </a:xfrm>
+          <a:prstGeom prst="line">
+            <a:avLst/>
+          </a:prstGeom>
+          <a:ln w="31750">
+            <a:solidFill>
+              <a:schemeClr val="accent5"/>
+            </a:solidFill>
+          </a:ln>
+        </p:spPr>
+        <p:style>
+          <a:lnRef idx="1">
+            <a:schemeClr val="accent1"/>
+          </a:lnRef>
+          <a:fillRef idx="0">
+            <a:schemeClr val="accent1"/>
+          </a:fillRef>
+          <a:effectRef idx="0">
+            <a:schemeClr val="accent1"/>
+          </a:effectRef>
+          <a:fontRef idx="minor">
+            <a:schemeClr val="tx1"/>
+          </a:fontRef>
+        </p:style>
+      </p:cxnSp>
+      <p:cxnSp>
+        <p:nvCxnSpPr>
+          <p:cNvPr id="59" name="Straight Connector 58"/>
+          <p:cNvCxnSpPr/>
+          <p:nvPr/>
+        </p:nvCxnSpPr>
+        <p:spPr>
+          <a:xfrm>
+            <a:off x="10279430" y="3772043"/>
+            <a:ext cx="640080" cy="0"/>
+          </a:xfrm>
+          <a:prstGeom prst="line">
+            <a:avLst/>
+          </a:prstGeom>
+          <a:ln w="31750">
+            <a:solidFill>
+              <a:srgbClr val="FF0000"/>
+            </a:solidFill>
+            <a:prstDash val="sysDot"/>
+          </a:ln>
+        </p:spPr>
+        <p:style>
+          <a:lnRef idx="1">
+            <a:schemeClr val="accent1"/>
+          </a:lnRef>
+          <a:fillRef idx="0">
+            <a:schemeClr val="accent1"/>
+          </a:fillRef>
+          <a:effectRef idx="0">
+            <a:schemeClr val="accent1"/>
+          </a:effectRef>
+          <a:fontRef idx="minor">
+            <a:schemeClr val="tx1"/>
+          </a:fontRef>
+        </p:style>
+      </p:cxnSp>
+      <p:cxnSp>
+        <p:nvCxnSpPr>
+          <p:cNvPr id="60" name="Straight Connector 59"/>
+          <p:cNvCxnSpPr/>
+          <p:nvPr/>
+        </p:nvCxnSpPr>
+        <p:spPr>
+          <a:xfrm flipV="1">
+            <a:off x="10279430" y="4031837"/>
+            <a:ext cx="640080" cy="4762"/>
+          </a:xfrm>
+          <a:prstGeom prst="line">
+            <a:avLst/>
+          </a:prstGeom>
+          <a:ln w="31750">
+            <a:solidFill>
+              <a:schemeClr val="accent2"/>
+            </a:solidFill>
+            <a:prstDash val="dash"/>
+          </a:ln>
+        </p:spPr>
+        <p:style>
+          <a:lnRef idx="1">
+            <a:schemeClr val="accent1"/>
+          </a:lnRef>
+          <a:fillRef idx="0">
+            <a:schemeClr val="accent1"/>
+          </a:fillRef>
+          <a:effectRef idx="0">
+            <a:schemeClr val="accent1"/>
+          </a:effectRef>
+          <a:fontRef idx="minor">
+            <a:schemeClr val="tx1"/>
+          </a:fontRef>
+        </p:style>
+      </p:cxnSp>
+      <p:sp>
+        <p:nvSpPr>
+          <p:cNvPr id="61" name="TextBox 60"/>
+          <p:cNvSpPr txBox="1"/>
+          <p:nvPr/>
+        </p:nvSpPr>
+        <p:spPr>
+          <a:xfrm>
+            <a:off x="9212970" y="3377409"/>
+            <a:ext cx="984565" cy="307777"/>
+          </a:xfrm>
+          <a:prstGeom prst="rect">
+            <a:avLst/>
+          </a:prstGeom>
+          <a:noFill/>
+        </p:spPr>
+        <p:txBody>
+          <a:bodyPr wrap="none" rtlCol="0">
+            <a:spAutoFit/>
+          </a:bodyPr>
+          <a:lstStyle/>
+          <a:p>
+            <a:r>
+              <a:rPr lang="en-US" sz="1400" dirty="0" err="1" smtClean="0">
+                <a:latin typeface="Myriad Pro" charset="0"/>
+                <a:ea typeface="Myriad Pro" charset="0"/>
+                <a:cs typeface="Myriad Pro" charset="0"/>
+              </a:rPr>
+              <a:t>Variational</a:t>
+            </a:r>
+            <a:endParaRPr lang="en-US" sz="1400" dirty="0">
+              <a:latin typeface="Myriad Pro" charset="0"/>
+              <a:ea typeface="Myriad Pro" charset="0"/>
+              <a:cs typeface="Myriad Pro" charset="0"/>
+            </a:endParaRPr>
+          </a:p>
+        </p:txBody>
+      </p:sp>
+      <p:sp>
+        <p:nvSpPr>
+          <p:cNvPr id="62" name="TextBox 61"/>
+          <p:cNvSpPr txBox="1"/>
+          <p:nvPr/>
+        </p:nvSpPr>
+        <p:spPr>
+          <a:xfrm>
+            <a:off x="9212968" y="3618155"/>
+            <a:ext cx="950901" cy="307777"/>
+          </a:xfrm>
+          <a:prstGeom prst="rect">
+            <a:avLst/>
+          </a:prstGeom>
+          <a:noFill/>
+        </p:spPr>
+        <p:txBody>
+          <a:bodyPr wrap="none" rtlCol="0">
+            <a:spAutoFit/>
+          </a:bodyPr>
+          <a:lstStyle/>
+          <a:p>
+            <a:r>
+              <a:rPr lang="en-US" sz="1400" dirty="0" smtClean="0">
+                <a:latin typeface="Myriad Pro" charset="0"/>
+                <a:ea typeface="Myriad Pro" charset="0"/>
+                <a:cs typeface="Myriad Pro" charset="0"/>
+              </a:rPr>
+              <a:t>Numerical</a:t>
+            </a:r>
+            <a:endParaRPr lang="en-US" sz="1400" dirty="0">
+              <a:latin typeface="Myriad Pro" charset="0"/>
+              <a:ea typeface="Myriad Pro" charset="0"/>
+              <a:cs typeface="Myriad Pro" charset="0"/>
+            </a:endParaRPr>
+          </a:p>
+        </p:txBody>
+      </p:sp>
+      <p:sp>
+        <p:nvSpPr>
+          <p:cNvPr id="63" name="TextBox 62"/>
+          <p:cNvSpPr txBox="1"/>
+          <p:nvPr/>
+        </p:nvSpPr>
+        <p:spPr>
+          <a:xfrm>
+            <a:off x="9212969" y="3877949"/>
+            <a:ext cx="1114408" cy="307777"/>
+          </a:xfrm>
+          <a:prstGeom prst="rect">
+            <a:avLst/>
+          </a:prstGeom>
+          <a:noFill/>
+        </p:spPr>
+        <p:txBody>
+          <a:bodyPr wrap="none" rtlCol="0">
+            <a:spAutoFit/>
+          </a:bodyPr>
+          <a:lstStyle/>
+          <a:p>
+            <a:r>
+              <a:rPr lang="en-US" sz="1400" dirty="0" err="1" smtClean="0">
+                <a:latin typeface="Myriad Pro" charset="0"/>
+                <a:ea typeface="Myriad Pro" charset="0"/>
+                <a:cs typeface="Myriad Pro" charset="0"/>
+              </a:rPr>
+              <a:t>Perturbative</a:t>
+            </a:r>
+            <a:endParaRPr lang="en-US" sz="1400" dirty="0">
+              <a:latin typeface="Myriad Pro" charset="0"/>
+              <a:ea typeface="Myriad Pro" charset="0"/>
+              <a:cs typeface="Myriad Pro" charset="0"/>
+            </a:endParaRPr>
+          </a:p>
+        </p:txBody>
+      </p:sp>
+      <p:sp>
+        <p:nvSpPr>
+          <p:cNvPr id="64" name="TextBox 63"/>
+          <p:cNvSpPr txBox="1"/>
+          <p:nvPr/>
+        </p:nvSpPr>
+        <p:spPr>
+          <a:xfrm>
+            <a:off x="11424394" y="5920075"/>
+            <a:ext cx="495649" cy="307777"/>
+          </a:xfrm>
+          <a:prstGeom prst="rect">
+            <a:avLst/>
+          </a:prstGeom>
+          <a:noFill/>
+        </p:spPr>
+        <p:txBody>
+          <a:bodyPr wrap="none" rtlCol="0">
+            <a:spAutoFit/>
+          </a:bodyPr>
+          <a:lstStyle/>
+          <a:p>
+            <a:r>
+              <a:rPr lang="en-US" sz="1400" dirty="0" smtClean="0">
+                <a:latin typeface="Myriad Pro" charset="0"/>
+                <a:ea typeface="Myriad Pro" charset="0"/>
+                <a:cs typeface="Myriad Pro" charset="0"/>
+              </a:rPr>
+              <a:t>0.94</a:t>
+            </a:r>
+            <a:endParaRPr lang="en-US" sz="1400" dirty="0">
+              <a:latin typeface="Myriad Pro" charset="0"/>
+              <a:ea typeface="Myriad Pro" charset="0"/>
+              <a:cs typeface="Myriad Pro" charset="0"/>
+            </a:endParaRPr>
+          </a:p>
+        </p:txBody>
+      </p:sp>
+      <p:sp>
+        <p:nvSpPr>
+          <p:cNvPr id="65" name="TextBox 64"/>
+          <p:cNvSpPr txBox="1"/>
+          <p:nvPr/>
+        </p:nvSpPr>
+        <p:spPr>
+          <a:xfrm>
+            <a:off x="9100438" y="5920075"/>
+            <a:ext cx="276038" cy="307777"/>
+          </a:xfrm>
+          <a:prstGeom prst="rect">
+            <a:avLst/>
+          </a:prstGeom>
+          <a:noFill/>
+        </p:spPr>
+        <p:txBody>
+          <a:bodyPr wrap="none" rtlCol="0">
+            <a:spAutoFit/>
+          </a:bodyPr>
+          <a:lstStyle/>
+          <a:p>
+            <a:r>
+              <a:rPr lang="en-US" sz="1400" dirty="0" smtClean="0">
+                <a:latin typeface="Myriad Pro" charset="0"/>
+                <a:ea typeface="Myriad Pro" charset="0"/>
+                <a:cs typeface="Myriad Pro" charset="0"/>
+              </a:rPr>
+              <a:t>0</a:t>
+            </a:r>
+            <a:endParaRPr lang="en-US" sz="1400" dirty="0">
+              <a:latin typeface="Myriad Pro" charset="0"/>
+              <a:ea typeface="Myriad Pro" charset="0"/>
+              <a:cs typeface="Myriad Pro" charset="0"/>
+            </a:endParaRPr>
+          </a:p>
+        </p:txBody>
+      </p:sp>
+      <p:sp>
+        <p:nvSpPr>
+          <p:cNvPr id="66" name="TextBox 65"/>
+          <p:cNvSpPr txBox="1"/>
+          <p:nvPr/>
+        </p:nvSpPr>
+        <p:spPr>
+          <a:xfrm>
+            <a:off x="10456385" y="3110669"/>
+            <a:ext cx="1452642" cy="307777"/>
+          </a:xfrm>
+          <a:prstGeom prst="rect">
+            <a:avLst/>
+          </a:prstGeom>
+          <a:noFill/>
+        </p:spPr>
+        <p:txBody>
+          <a:bodyPr wrap="none" rtlCol="0">
+            <a:spAutoFit/>
+          </a:bodyPr>
+          <a:lstStyle/>
+          <a:p>
+            <a:r>
+              <a:rPr lang="en-US" sz="1400" dirty="0" smtClean="0">
+                <a:latin typeface="Myriad Pro" charset="0"/>
+                <a:ea typeface="Myriad Pro" charset="0"/>
+                <a:cs typeface="Myriad Pro" charset="0"/>
+              </a:rPr>
+              <a:t>N</a:t>
+            </a:r>
+            <a:r>
+              <a:rPr lang="en-US" sz="1400" baseline="-25000" dirty="0" smtClean="0">
+                <a:latin typeface="Myriad Pro" charset="0"/>
+                <a:ea typeface="Myriad Pro" charset="0"/>
+                <a:cs typeface="Myriad Pro" charset="0"/>
+              </a:rPr>
+              <a:t>a</a:t>
+            </a:r>
+            <a:r>
+              <a:rPr lang="en-US" sz="1400" dirty="0" smtClean="0">
+                <a:latin typeface="Myriad Pro" charset="0"/>
+                <a:ea typeface="Myriad Pro" charset="0"/>
+                <a:cs typeface="Myriad Pro" charset="0"/>
+              </a:rPr>
+              <a:t> = 2, R =2.76 </a:t>
+            </a:r>
+            <a:r>
+              <a:rPr lang="en-US" sz="1400" dirty="0" err="1" smtClean="0">
+                <a:latin typeface="Myriad Pro" charset="0"/>
+                <a:ea typeface="Myriad Pro" charset="0"/>
+                <a:cs typeface="Myriad Pro" charset="0"/>
+              </a:rPr>
+              <a:t>Å</a:t>
+            </a:r>
+            <a:r>
+              <a:rPr lang="en-US" sz="1400" dirty="0" smtClean="0">
+                <a:latin typeface="Myriad Pro" charset="0"/>
+                <a:ea typeface="Myriad Pro" charset="0"/>
+                <a:cs typeface="Myriad Pro" charset="0"/>
+              </a:rPr>
+              <a:t> </a:t>
+            </a:r>
+            <a:endParaRPr lang="en-US" sz="1400" dirty="0">
               <a:latin typeface="Myriad Pro" charset="0"/>
               <a:ea typeface="Myriad Pro" charset="0"/>
               <a:cs typeface="Myriad Pro" charset="0"/>

</xml_diff>

<commit_message>
slight edit after johannes' comment
</commit_message>
<xml_diff>
--- a/Figure2and3combined.pptx
+++ b/Figure2and3combined.pptx
@@ -243,7 +243,7 @@
           <a:p>
             <a:fld id="{9A283E05-7B2C-074B-99DE-E9002AD7BB3A}" type="datetimeFigureOut">
               <a:rPr lang="en-US" smtClean="0"/>
-              <a:t>1/26/19</a:t>
+              <a:t>1/27/19</a:t>
             </a:fld>
             <a:endParaRPr lang="en-US"/>
           </a:p>
@@ -413,7 +413,7 @@
           <a:p>
             <a:fld id="{9A283E05-7B2C-074B-99DE-E9002AD7BB3A}" type="datetimeFigureOut">
               <a:rPr lang="en-US" smtClean="0"/>
-              <a:t>1/26/19</a:t>
+              <a:t>1/27/19</a:t>
             </a:fld>
             <a:endParaRPr lang="en-US"/>
           </a:p>
@@ -593,7 +593,7 @@
           <a:p>
             <a:fld id="{9A283E05-7B2C-074B-99DE-E9002AD7BB3A}" type="datetimeFigureOut">
               <a:rPr lang="en-US" smtClean="0"/>
-              <a:t>1/26/19</a:t>
+              <a:t>1/27/19</a:t>
             </a:fld>
             <a:endParaRPr lang="en-US"/>
           </a:p>
@@ -763,7 +763,7 @@
           <a:p>
             <a:fld id="{9A283E05-7B2C-074B-99DE-E9002AD7BB3A}" type="datetimeFigureOut">
               <a:rPr lang="en-US" smtClean="0"/>
-              <a:t>1/26/19</a:t>
+              <a:t>1/27/19</a:t>
             </a:fld>
             <a:endParaRPr lang="en-US"/>
           </a:p>
@@ -1009,7 +1009,7 @@
           <a:p>
             <a:fld id="{9A283E05-7B2C-074B-99DE-E9002AD7BB3A}" type="datetimeFigureOut">
               <a:rPr lang="en-US" smtClean="0"/>
-              <a:t>1/26/19</a:t>
+              <a:t>1/27/19</a:t>
             </a:fld>
             <a:endParaRPr lang="en-US"/>
           </a:p>
@@ -1241,7 +1241,7 @@
           <a:p>
             <a:fld id="{9A283E05-7B2C-074B-99DE-E9002AD7BB3A}" type="datetimeFigureOut">
               <a:rPr lang="en-US" smtClean="0"/>
-              <a:t>1/26/19</a:t>
+              <a:t>1/27/19</a:t>
             </a:fld>
             <a:endParaRPr lang="en-US"/>
           </a:p>
@@ -1608,7 +1608,7 @@
           <a:p>
             <a:fld id="{9A283E05-7B2C-074B-99DE-E9002AD7BB3A}" type="datetimeFigureOut">
               <a:rPr lang="en-US" smtClean="0"/>
-              <a:t>1/26/19</a:t>
+              <a:t>1/27/19</a:t>
             </a:fld>
             <a:endParaRPr lang="en-US"/>
           </a:p>
@@ -1726,7 +1726,7 @@
           <a:p>
             <a:fld id="{9A283E05-7B2C-074B-99DE-E9002AD7BB3A}" type="datetimeFigureOut">
               <a:rPr lang="en-US" smtClean="0"/>
-              <a:t>1/26/19</a:t>
+              <a:t>1/27/19</a:t>
             </a:fld>
             <a:endParaRPr lang="en-US"/>
           </a:p>
@@ -1821,7 +1821,7 @@
           <a:p>
             <a:fld id="{9A283E05-7B2C-074B-99DE-E9002AD7BB3A}" type="datetimeFigureOut">
               <a:rPr lang="en-US" smtClean="0"/>
-              <a:t>1/26/19</a:t>
+              <a:t>1/27/19</a:t>
             </a:fld>
             <a:endParaRPr lang="en-US"/>
           </a:p>
@@ -2098,7 +2098,7 @@
           <a:p>
             <a:fld id="{9A283E05-7B2C-074B-99DE-E9002AD7BB3A}" type="datetimeFigureOut">
               <a:rPr lang="en-US" smtClean="0"/>
-              <a:t>1/26/19</a:t>
+              <a:t>1/27/19</a:t>
             </a:fld>
             <a:endParaRPr lang="en-US"/>
           </a:p>
@@ -2351,7 +2351,7 @@
           <a:p>
             <a:fld id="{9A283E05-7B2C-074B-99DE-E9002AD7BB3A}" type="datetimeFigureOut">
               <a:rPr lang="en-US" smtClean="0"/>
-              <a:t>1/26/19</a:t>
+              <a:t>1/27/19</a:t>
             </a:fld>
             <a:endParaRPr lang="en-US"/>
           </a:p>
@@ -2564,7 +2564,7 @@
           <a:p>
             <a:fld id="{9A283E05-7B2C-074B-99DE-E9002AD7BB3A}" type="datetimeFigureOut">
               <a:rPr lang="en-US" smtClean="0"/>
-              <a:t>1/26/19</a:t>
+              <a:t>1/27/19</a:t>
             </a:fld>
             <a:endParaRPr lang="en-US"/>
           </a:p>
@@ -5282,6 +5282,636 @@
           </a:p>
         </p:txBody>
       </p:sp>
+      <mc:AlternateContent xmlns:mc="http://schemas.openxmlformats.org/markup-compatibility/2006">
+        <mc:Choice xmlns:a14="http://schemas.microsoft.com/office/drawing/2010/main" Requires="a14">
+          <p:sp>
+            <p:nvSpPr>
+              <p:cNvPr id="27" name="TextBox 26"/>
+              <p:cNvSpPr txBox="1"/>
+              <p:nvPr/>
+            </p:nvSpPr>
+            <p:spPr>
+              <a:xfrm>
+                <a:off x="10949046" y="5584414"/>
+                <a:ext cx="646074" cy="262444"/>
+              </a:xfrm>
+              <a:prstGeom prst="rect">
+                <a:avLst/>
+              </a:prstGeom>
+              <a:noFill/>
+            </p:spPr>
+            <p:txBody>
+              <a:bodyPr wrap="none" lIns="0" tIns="0" rIns="0" bIns="0" rtlCol="0">
+                <a:spAutoFit/>
+              </a:bodyPr>
+              <a:lstStyle/>
+              <a:p>
+                <a14:m>
+                  <m:oMathPara xmlns:m="http://schemas.openxmlformats.org/officeDocument/2006/math">
+                    <m:oMathParaPr>
+                      <m:jc m:val="centerGroup"/>
+                    </m:oMathParaPr>
+                    <m:oMath xmlns:m="http://schemas.openxmlformats.org/officeDocument/2006/math">
+                      <m:d>
+                        <m:dPr>
+                          <m:begChr m:val="〈"/>
+                          <m:endChr m:val="〉"/>
+                          <m:ctrlPr>
+                            <a:rPr lang="en-US" sz="1200" i="1">
+                              <a:solidFill>
+                                <a:schemeClr val="accent5"/>
+                              </a:solidFill>
+                              <a:latin typeface="Cambria Math" charset="0"/>
+                              <a:ea typeface="Myriad Pro" charset="0"/>
+                              <a:cs typeface="Myriad Pro" charset="0"/>
+                            </a:rPr>
+                          </m:ctrlPr>
+                        </m:dPr>
+                        <m:e>
+                          <m:sSubSup>
+                            <m:sSubSupPr>
+                              <m:ctrlPr>
+                                <a:rPr lang="en-US" sz="1200" i="1">
+                                  <a:solidFill>
+                                    <a:schemeClr val="accent5"/>
+                                  </a:solidFill>
+                                  <a:latin typeface="Cambria Math" charset="0"/>
+                                  <a:ea typeface="Myriad Pro" charset="0"/>
+                                  <a:cs typeface="Myriad Pro" charset="0"/>
+                                </a:rPr>
+                              </m:ctrlPr>
+                            </m:sSubSupPr>
+                            <m:e>
+                              <m:r>
+                                <m:rPr>
+                                  <m:nor/>
+                                </m:rPr>
+                                <a:rPr lang="en-US" sz="1200">
+                                  <a:solidFill>
+                                    <a:schemeClr val="accent5"/>
+                                  </a:solidFill>
+                                  <a:latin typeface="Myriad Pro" charset="0"/>
+                                  <a:ea typeface="Myriad Pro" charset="0"/>
+                                  <a:cs typeface="Myriad Pro" charset="0"/>
+                                </a:rPr>
+                                <m:t>a</m:t>
+                              </m:r>
+                            </m:e>
+                            <m:sub>
+                              <m:r>
+                                <m:rPr>
+                                  <m:nor/>
+                                </m:rPr>
+                                <a:rPr lang="en-US" sz="1200">
+                                  <a:solidFill>
+                                    <a:schemeClr val="accent5"/>
+                                  </a:solidFill>
+                                  <a:latin typeface="Myriad Pro" charset="0"/>
+                                  <a:ea typeface="Myriad Pro" charset="0"/>
+                                  <a:cs typeface="Myriad Pro" charset="0"/>
+                                </a:rPr>
+                                <m:t>int</m:t>
+                              </m:r>
+                            </m:sub>
+                            <m:sup>
+                              <m:r>
+                                <m:rPr>
+                                  <m:nor/>
+                                </m:rPr>
+                                <a:rPr lang="en-US" sz="1200">
+                                  <a:solidFill>
+                                    <a:schemeClr val="accent5"/>
+                                  </a:solidFill>
+                                  <a:latin typeface="Myriad Pro" charset="0"/>
+                                  <a:ea typeface="Myriad Pro" charset="0"/>
+                                  <a:cs typeface="Myriad Pro" charset="0"/>
+                                </a:rPr>
+                                <m:t>†</m:t>
+                              </m:r>
+                            </m:sup>
+                          </m:sSubSup>
+                          <m:sSub>
+                            <m:sSubPr>
+                              <m:ctrlPr>
+                                <a:rPr lang="en-US" sz="1200" i="1">
+                                  <a:solidFill>
+                                    <a:schemeClr val="accent5"/>
+                                  </a:solidFill>
+                                  <a:latin typeface="Cambria Math" charset="0"/>
+                                  <a:ea typeface="Myriad Pro" charset="0"/>
+                                  <a:cs typeface="Myriad Pro" charset="0"/>
+                                </a:rPr>
+                              </m:ctrlPr>
+                            </m:sSubPr>
+                            <m:e>
+                              <m:r>
+                                <m:rPr>
+                                  <m:nor/>
+                                </m:rPr>
+                                <a:rPr lang="en-US" sz="1200">
+                                  <a:solidFill>
+                                    <a:schemeClr val="accent5"/>
+                                  </a:solidFill>
+                                  <a:latin typeface="Myriad Pro" charset="0"/>
+                                  <a:ea typeface="Myriad Pro" charset="0"/>
+                                  <a:cs typeface="Myriad Pro" charset="0"/>
+                                </a:rPr>
+                                <m:t>a</m:t>
+                              </m:r>
+                            </m:e>
+                            <m:sub>
+                              <m:r>
+                                <m:rPr>
+                                  <m:nor/>
+                                </m:rPr>
+                                <a:rPr lang="en-US" sz="1200">
+                                  <a:solidFill>
+                                    <a:schemeClr val="accent5"/>
+                                  </a:solidFill>
+                                  <a:latin typeface="Myriad Pro" charset="0"/>
+                                  <a:ea typeface="Myriad Pro" charset="0"/>
+                                  <a:cs typeface="Myriad Pro" charset="0"/>
+                                </a:rPr>
+                                <m:t>int</m:t>
+                              </m:r>
+                            </m:sub>
+                          </m:sSub>
+                        </m:e>
+                      </m:d>
+                    </m:oMath>
+                  </m:oMathPara>
+                </a14:m>
+                <a:endParaRPr lang="en-US" sz="1200" dirty="0">
+                  <a:solidFill>
+                    <a:schemeClr val="accent5"/>
+                  </a:solidFill>
+                  <a:latin typeface="Myriad Pro" charset="0"/>
+                  <a:ea typeface="Myriad Pro" charset="0"/>
+                  <a:cs typeface="Myriad Pro" charset="0"/>
+                </a:endParaRPr>
+              </a:p>
+            </p:txBody>
+          </p:sp>
+        </mc:Choice>
+        <mc:Fallback>
+          <p:sp>
+            <p:nvSpPr>
+              <p:cNvPr id="27" name="TextBox 26"/>
+              <p:cNvSpPr txBox="1">
+                <a:spLocks noRot="1" noChangeAspect="1" noMove="1" noResize="1" noEditPoints="1" noAdjustHandles="1" noChangeArrowheads="1" noChangeShapeType="1" noTextEdit="1"/>
+              </p:cNvSpPr>
+              <p:nvPr/>
+            </p:nvSpPr>
+            <p:spPr>
+              <a:xfrm>
+                <a:off x="10949046" y="5584414"/>
+                <a:ext cx="646074" cy="262444"/>
+              </a:xfrm>
+              <a:prstGeom prst="rect">
+                <a:avLst/>
+              </a:prstGeom>
+              <a:blipFill rotWithShape="0">
+                <a:blip r:embed="rId9"/>
+                <a:stretch>
+                  <a:fillRect t="-2326" b="-20930"/>
+                </a:stretch>
+              </a:blipFill>
+            </p:spPr>
+            <p:txBody>
+              <a:bodyPr/>
+              <a:lstStyle/>
+              <a:p>
+                <a:r>
+                  <a:rPr lang="en-US">
+                    <a:noFill/>
+                  </a:rPr>
+                  <a:t> </a:t>
+                </a:r>
+              </a:p>
+            </p:txBody>
+          </p:sp>
+        </mc:Fallback>
+      </mc:AlternateContent>
+      <mc:AlternateContent xmlns:mc="http://schemas.openxmlformats.org/markup-compatibility/2006">
+        <mc:Choice xmlns:a14="http://schemas.microsoft.com/office/drawing/2010/main" Requires="a14">
+          <p:sp>
+            <p:nvSpPr>
+              <p:cNvPr id="67" name="TextBox 66"/>
+              <p:cNvSpPr txBox="1"/>
+              <p:nvPr/>
+            </p:nvSpPr>
+            <p:spPr>
+              <a:xfrm>
+                <a:off x="10820805" y="5129983"/>
+                <a:ext cx="902555" cy="265457"/>
+              </a:xfrm>
+              <a:prstGeom prst="rect">
+                <a:avLst/>
+              </a:prstGeom>
+              <a:noFill/>
+            </p:spPr>
+            <p:txBody>
+              <a:bodyPr wrap="none" lIns="0" tIns="0" rIns="0" bIns="0" rtlCol="0">
+                <a:spAutoFit/>
+              </a:bodyPr>
+              <a:lstStyle/>
+              <a:p>
+                <a14:m>
+                  <m:oMathPara xmlns:m="http://schemas.openxmlformats.org/officeDocument/2006/math">
+                    <m:oMathParaPr>
+                      <m:jc m:val="centerGroup"/>
+                    </m:oMathParaPr>
+                    <m:oMath xmlns:m="http://schemas.openxmlformats.org/officeDocument/2006/math">
+                      <m:d>
+                        <m:dPr>
+                          <m:begChr m:val="〈"/>
+                          <m:endChr m:val="〉"/>
+                          <m:ctrlPr>
+                            <a:rPr lang="en-US" sz="1200" i="1" smtClean="0">
+                              <a:solidFill>
+                                <a:srgbClr val="FF0000"/>
+                              </a:solidFill>
+                              <a:latin typeface="Cambria Math" charset="0"/>
+                              <a:ea typeface="Myriad Pro" charset="0"/>
+                              <a:cs typeface="Myriad Pro" charset="0"/>
+                            </a:rPr>
+                          </m:ctrlPr>
+                        </m:dPr>
+                        <m:e>
+                          <m:sSubSup>
+                            <m:sSubSupPr>
+                              <m:ctrlPr>
+                                <a:rPr lang="en-US" sz="1200" i="1">
+                                  <a:solidFill>
+                                    <a:srgbClr val="FF0000"/>
+                                  </a:solidFill>
+                                  <a:latin typeface="Myriad Pro" charset="0"/>
+                                  <a:ea typeface="Myriad Pro" charset="0"/>
+                                  <a:cs typeface="Myriad Pro" charset="0"/>
+                                </a:rPr>
+                              </m:ctrlPr>
+                            </m:sSubSupPr>
+                            <m:e>
+                              <m:r>
+                                <m:rPr>
+                                  <m:nor/>
+                                </m:rPr>
+                                <a:rPr lang="en-US" sz="1200">
+                                  <a:solidFill>
+                                    <a:srgbClr val="FF0000"/>
+                                  </a:solidFill>
+                                  <a:latin typeface="Myriad Pro" charset="0"/>
+                                  <a:ea typeface="Myriad Pro" charset="0"/>
+                                  <a:cs typeface="Myriad Pro" charset="0"/>
+                                </a:rPr>
+                                <m:t>a</m:t>
+                              </m:r>
+                            </m:e>
+                            <m:sub>
+                              <m:r>
+                                <m:rPr>
+                                  <m:nor/>
+                                </m:rPr>
+                                <a:rPr lang="en-US" sz="1200" b="0" i="0" smtClean="0">
+                                  <a:solidFill>
+                                    <a:srgbClr val="FF0000"/>
+                                  </a:solidFill>
+                                  <a:latin typeface="Myriad Pro" charset="0"/>
+                                  <a:ea typeface="Myriad Pro" charset="0"/>
+                                  <a:cs typeface="Myriad Pro" charset="0"/>
+                                </a:rPr>
+                                <m:t>bare</m:t>
+                              </m:r>
+                            </m:sub>
+                            <m:sup>
+                              <m:r>
+                                <m:rPr>
+                                  <m:nor/>
+                                </m:rPr>
+                                <a:rPr lang="en-US" sz="1200">
+                                  <a:solidFill>
+                                    <a:srgbClr val="FF0000"/>
+                                  </a:solidFill>
+                                  <a:latin typeface="Myriad Pro" charset="0"/>
+                                  <a:ea typeface="Myriad Pro" charset="0"/>
+                                  <a:cs typeface="Myriad Pro" charset="0"/>
+                                </a:rPr>
+                                <m:t>†</m:t>
+                              </m:r>
+                            </m:sup>
+                          </m:sSubSup>
+                          <m:sSub>
+                            <m:sSubPr>
+                              <m:ctrlPr>
+                                <a:rPr lang="en-US" sz="1200" i="1">
+                                  <a:solidFill>
+                                    <a:srgbClr val="FF0000"/>
+                                  </a:solidFill>
+                                  <a:latin typeface="Myriad Pro" charset="0"/>
+                                  <a:ea typeface="Myriad Pro" charset="0"/>
+                                  <a:cs typeface="Myriad Pro" charset="0"/>
+                                </a:rPr>
+                              </m:ctrlPr>
+                            </m:sSubPr>
+                            <m:e>
+                              <m:r>
+                                <m:rPr>
+                                  <m:nor/>
+                                </m:rPr>
+                                <a:rPr lang="en-US" sz="1200">
+                                  <a:solidFill>
+                                    <a:srgbClr val="FF0000"/>
+                                  </a:solidFill>
+                                  <a:latin typeface="Myriad Pro" charset="0"/>
+                                  <a:ea typeface="Myriad Pro" charset="0"/>
+                                  <a:cs typeface="Myriad Pro" charset="0"/>
+                                </a:rPr>
+                                <m:t>a</m:t>
+                              </m:r>
+                            </m:e>
+                            <m:sub>
+                              <m:r>
+                                <m:rPr>
+                                  <m:nor/>
+                                </m:rPr>
+                                <a:rPr lang="en-US" sz="1200" b="0" i="0" smtClean="0">
+                                  <a:solidFill>
+                                    <a:srgbClr val="FF0000"/>
+                                  </a:solidFill>
+                                  <a:latin typeface="Myriad Pro" charset="0"/>
+                                  <a:ea typeface="Myriad Pro" charset="0"/>
+                                  <a:cs typeface="Myriad Pro" charset="0"/>
+                                </a:rPr>
+                                <m:t>bare</m:t>
+                              </m:r>
+                            </m:sub>
+                          </m:sSub>
+                        </m:e>
+                      </m:d>
+                    </m:oMath>
+                  </m:oMathPara>
+                </a14:m>
+                <a:endParaRPr lang="en-US" sz="1200" dirty="0">
+                  <a:solidFill>
+                    <a:srgbClr val="FF0000"/>
+                  </a:solidFill>
+                  <a:latin typeface="Myriad Pro" charset="0"/>
+                  <a:ea typeface="Myriad Pro" charset="0"/>
+                  <a:cs typeface="Myriad Pro" charset="0"/>
+                </a:endParaRPr>
+              </a:p>
+            </p:txBody>
+          </p:sp>
+        </mc:Choice>
+        <mc:Fallback>
+          <p:sp>
+            <p:nvSpPr>
+              <p:cNvPr id="67" name="TextBox 66"/>
+              <p:cNvSpPr txBox="1">
+                <a:spLocks noRot="1" noChangeAspect="1" noMove="1" noResize="1" noEditPoints="1" noAdjustHandles="1" noChangeArrowheads="1" noChangeShapeType="1" noTextEdit="1"/>
+              </p:cNvSpPr>
+              <p:nvPr/>
+            </p:nvSpPr>
+            <p:spPr>
+              <a:xfrm>
+                <a:off x="10820805" y="5129983"/>
+                <a:ext cx="902555" cy="265457"/>
+              </a:xfrm>
+              <a:prstGeom prst="rect">
+                <a:avLst/>
+              </a:prstGeom>
+              <a:blipFill rotWithShape="0">
+                <a:blip r:embed="rId10"/>
+                <a:stretch>
+                  <a:fillRect t="-2326" b="-27907"/>
+                </a:stretch>
+              </a:blipFill>
+            </p:spPr>
+            <p:txBody>
+              <a:bodyPr/>
+              <a:lstStyle/>
+              <a:p>
+                <a:r>
+                  <a:rPr lang="en-US">
+                    <a:noFill/>
+                  </a:rPr>
+                  <a:t> </a:t>
+                </a:r>
+              </a:p>
+            </p:txBody>
+          </p:sp>
+        </mc:Fallback>
+      </mc:AlternateContent>
+      <mc:AlternateContent xmlns:mc="http://schemas.openxmlformats.org/markup-compatibility/2006">
+        <mc:Choice xmlns:a14="http://schemas.microsoft.com/office/drawing/2010/main" Requires="a14">
+          <p:sp>
+            <p:nvSpPr>
+              <p:cNvPr id="68" name="TextBox 67"/>
+              <p:cNvSpPr txBox="1"/>
+              <p:nvPr/>
+            </p:nvSpPr>
+            <p:spPr>
+              <a:xfrm>
+                <a:off x="9770344" y="4716881"/>
+                <a:ext cx="902555" cy="265457"/>
+              </a:xfrm>
+              <a:prstGeom prst="rect">
+                <a:avLst/>
+              </a:prstGeom>
+              <a:noFill/>
+            </p:spPr>
+            <p:txBody>
+              <a:bodyPr wrap="none" lIns="0" tIns="0" rIns="0" bIns="0" rtlCol="0">
+                <a:spAutoFit/>
+              </a:bodyPr>
+              <a:lstStyle/>
+              <a:p>
+                <a14:m>
+                  <m:oMathPara xmlns:m="http://schemas.openxmlformats.org/officeDocument/2006/math">
+                    <m:oMathParaPr>
+                      <m:jc m:val="centerGroup"/>
+                    </m:oMathParaPr>
+                    <m:oMath xmlns:m="http://schemas.openxmlformats.org/officeDocument/2006/math">
+                      <m:d>
+                        <m:dPr>
+                          <m:begChr m:val="〈"/>
+                          <m:endChr m:val="〉"/>
+                          <m:ctrlPr>
+                            <a:rPr lang="en-US" sz="1200" i="1" smtClean="0">
+                              <a:solidFill>
+                                <a:schemeClr val="accent2"/>
+                              </a:solidFill>
+                              <a:latin typeface="Myriad Pro" charset="0"/>
+                              <a:ea typeface="Myriad Pro" charset="0"/>
+                              <a:cs typeface="Myriad Pro" charset="0"/>
+                            </a:rPr>
+                          </m:ctrlPr>
+                        </m:dPr>
+                        <m:e>
+                          <m:sSubSup>
+                            <m:sSubSupPr>
+                              <m:ctrlPr>
+                                <a:rPr lang="en-US" sz="1200" i="1">
+                                  <a:solidFill>
+                                    <a:schemeClr val="accent2"/>
+                                  </a:solidFill>
+                                  <a:latin typeface="Myriad Pro" charset="0"/>
+                                  <a:ea typeface="Myriad Pro" charset="0"/>
+                                  <a:cs typeface="Myriad Pro" charset="0"/>
+                                </a:rPr>
+                              </m:ctrlPr>
+                            </m:sSubSupPr>
+                            <m:e>
+                              <m:r>
+                                <m:rPr>
+                                  <m:nor/>
+                                </m:rPr>
+                                <a:rPr lang="en-US" sz="1200">
+                                  <a:solidFill>
+                                    <a:schemeClr val="accent2"/>
+                                  </a:solidFill>
+                                  <a:latin typeface="Myriad Pro" charset="0"/>
+                                  <a:ea typeface="Myriad Pro" charset="0"/>
+                                  <a:cs typeface="Myriad Pro" charset="0"/>
+                                </a:rPr>
+                                <m:t>a</m:t>
+                              </m:r>
+                            </m:e>
+                            <m:sub>
+                              <m:r>
+                                <m:rPr>
+                                  <m:nor/>
+                                </m:rPr>
+                                <a:rPr lang="en-US" sz="1200" b="0" i="0" smtClean="0">
+                                  <a:solidFill>
+                                    <a:schemeClr val="accent2"/>
+                                  </a:solidFill>
+                                  <a:latin typeface="Myriad Pro" charset="0"/>
+                                  <a:ea typeface="Myriad Pro" charset="0"/>
+                                  <a:cs typeface="Myriad Pro" charset="0"/>
+                                </a:rPr>
+                                <m:t>bare</m:t>
+                              </m:r>
+                            </m:sub>
+                            <m:sup>
+                              <m:r>
+                                <m:rPr>
+                                  <m:nor/>
+                                </m:rPr>
+                                <a:rPr lang="en-US" sz="1200">
+                                  <a:solidFill>
+                                    <a:schemeClr val="accent2"/>
+                                  </a:solidFill>
+                                  <a:latin typeface="Myriad Pro" charset="0"/>
+                                  <a:ea typeface="Myriad Pro" charset="0"/>
+                                  <a:cs typeface="Myriad Pro" charset="0"/>
+                                </a:rPr>
+                                <m:t>†</m:t>
+                              </m:r>
+                            </m:sup>
+                          </m:sSubSup>
+                          <m:sSub>
+                            <m:sSubPr>
+                              <m:ctrlPr>
+                                <a:rPr lang="en-US" sz="1200" i="1">
+                                  <a:solidFill>
+                                    <a:schemeClr val="accent2"/>
+                                  </a:solidFill>
+                                  <a:latin typeface="Myriad Pro" charset="0"/>
+                                  <a:ea typeface="Myriad Pro" charset="0"/>
+                                  <a:cs typeface="Myriad Pro" charset="0"/>
+                                </a:rPr>
+                              </m:ctrlPr>
+                            </m:sSubPr>
+                            <m:e>
+                              <m:r>
+                                <m:rPr>
+                                  <m:nor/>
+                                </m:rPr>
+                                <a:rPr lang="en-US" sz="1200">
+                                  <a:solidFill>
+                                    <a:schemeClr val="accent2"/>
+                                  </a:solidFill>
+                                  <a:latin typeface="Myriad Pro" charset="0"/>
+                                  <a:ea typeface="Myriad Pro" charset="0"/>
+                                  <a:cs typeface="Myriad Pro" charset="0"/>
+                                </a:rPr>
+                                <m:t>a</m:t>
+                              </m:r>
+                            </m:e>
+                            <m:sub>
+                              <m:r>
+                                <m:rPr>
+                                  <m:nor/>
+                                </m:rPr>
+                                <a:rPr lang="en-US" sz="1200" b="0" i="0" smtClean="0">
+                                  <a:solidFill>
+                                    <a:schemeClr val="accent2"/>
+                                  </a:solidFill>
+                                  <a:latin typeface="Myriad Pro" charset="0"/>
+                                  <a:ea typeface="Myriad Pro" charset="0"/>
+                                  <a:cs typeface="Myriad Pro" charset="0"/>
+                                </a:rPr>
+                                <m:t>bare</m:t>
+                              </m:r>
+                            </m:sub>
+                          </m:sSub>
+                        </m:e>
+                      </m:d>
+                    </m:oMath>
+                  </m:oMathPara>
+                </a14:m>
+                <a:endParaRPr lang="en-US" sz="1200" dirty="0">
+                  <a:solidFill>
+                    <a:schemeClr val="accent2"/>
+                  </a:solidFill>
+                  <a:latin typeface="Myriad Pro" charset="0"/>
+                  <a:ea typeface="Myriad Pro" charset="0"/>
+                  <a:cs typeface="Myriad Pro" charset="0"/>
+                </a:endParaRPr>
+              </a:p>
+            </p:txBody>
+          </p:sp>
+        </mc:Choice>
+        <mc:Fallback>
+          <p:sp>
+            <p:nvSpPr>
+              <p:cNvPr id="68" name="TextBox 67"/>
+              <p:cNvSpPr txBox="1">
+                <a:spLocks noRot="1" noChangeAspect="1" noMove="1" noResize="1" noEditPoints="1" noAdjustHandles="1" noChangeArrowheads="1" noChangeShapeType="1" noTextEdit="1"/>
+              </p:cNvSpPr>
+              <p:nvPr/>
+            </p:nvSpPr>
+            <p:spPr>
+              <a:xfrm>
+                <a:off x="9770344" y="4716881"/>
+                <a:ext cx="902555" cy="265457"/>
+              </a:xfrm>
+              <a:prstGeom prst="rect">
+                <a:avLst/>
+              </a:prstGeom>
+              <a:blipFill rotWithShape="0">
+                <a:blip r:embed="rId11"/>
+                <a:stretch>
+                  <a:fillRect t="-2326" b="-27907"/>
+                </a:stretch>
+              </a:blipFill>
+            </p:spPr>
+            <p:txBody>
+              <a:bodyPr/>
+              <a:lstStyle/>
+              <a:p>
+                <a:r>
+                  <a:rPr lang="en-US">
+                    <a:noFill/>
+                  </a:rPr>
+                  <a:t> </a:t>
+                </a:r>
+              </a:p>
+            </p:txBody>
+          </p:sp>
+        </mc:Fallback>
+      </mc:AlternateContent>
     </p:spTree>
     <p:extLst>
       <p:ext uri="{BB962C8B-B14F-4D97-AF65-F5344CB8AC3E}">

</xml_diff>